<commit_message>
chnaged size of pict
</commit_message>
<xml_diff>
--- a/files/BTstack_diagrams.pptx
+++ b/files/BTstack_diagrams.pptx
@@ -929,7 +929,7 @@
       </dgm:t>
     </dgm:pt>
     <dgm:pt modelId="{A5C862F1-617D-F04C-A0E0-577A46468776}">
-      <dgm:prSet phldrT="[Text]"/>
+      <dgm:prSet phldrT="[Text]" custT="1"/>
       <dgm:spPr>
         <a:ln w="28575" cap="flat" cmpd="sng" algn="ctr">
           <a:solidFill>
@@ -951,10 +951,10 @@
         <a:lstStyle/>
         <a:p>
           <a:r>
-            <a:rPr lang="en-US" dirty="0" smtClean="0"/>
+            <a:rPr lang="en-US" sz="1000" dirty="0" smtClean="0"/>
             <a:t>Data Source</a:t>
           </a:r>
-          <a:endParaRPr lang="en-US" dirty="0"/>
+          <a:endParaRPr lang="en-US" sz="1000" dirty="0"/>
         </a:p>
       </dgm:t>
     </dgm:pt>
@@ -965,7 +965,7 @@
         <a:bodyPr/>
         <a:lstStyle/>
         <a:p>
-          <a:endParaRPr lang="en-US"/>
+          <a:endParaRPr lang="en-US" sz="2000"/>
         </a:p>
       </dgm:t>
     </dgm:pt>
@@ -990,12 +990,12 @@
         <a:bodyPr/>
         <a:lstStyle/>
         <a:p>
-          <a:endParaRPr lang="en-US"/>
+          <a:endParaRPr lang="en-US" sz="2000"/>
         </a:p>
       </dgm:t>
     </dgm:pt>
     <dgm:pt modelId="{B119A6BE-4C69-C64A-9760-20D7BEA835F3}">
-      <dgm:prSet phldrT="[Text]"/>
+      <dgm:prSet phldrT="[Text]" custT="1"/>
       <dgm:spPr>
         <a:ln w="28575" cap="flat" cmpd="sng" algn="ctr">
           <a:solidFill>
@@ -1017,10 +1017,10 @@
         <a:lstStyle/>
         <a:p>
           <a:r>
-            <a:rPr lang="en-US" dirty="0" smtClean="0"/>
+            <a:rPr lang="en-US" sz="1000" dirty="0" smtClean="0"/>
             <a:t>Data Source</a:t>
           </a:r>
-          <a:endParaRPr lang="en-US" dirty="0"/>
+          <a:endParaRPr lang="en-US" sz="1000" dirty="0"/>
         </a:p>
       </dgm:t>
     </dgm:pt>
@@ -1031,7 +1031,7 @@
         <a:bodyPr/>
         <a:lstStyle/>
         <a:p>
-          <a:endParaRPr lang="en-US"/>
+          <a:endParaRPr lang="en-US" sz="2000"/>
         </a:p>
       </dgm:t>
     </dgm:pt>
@@ -1056,12 +1056,12 @@
         <a:bodyPr/>
         <a:lstStyle/>
         <a:p>
-          <a:endParaRPr lang="en-US"/>
+          <a:endParaRPr lang="en-US" sz="2000"/>
         </a:p>
       </dgm:t>
     </dgm:pt>
     <dgm:pt modelId="{6C85830B-5DCD-5E4E-97A4-C644D9793A17}">
-      <dgm:prSet phldrT="[Text]"/>
+      <dgm:prSet phldrT="[Text]" custT="1"/>
       <dgm:spPr>
         <a:ln w="28575" cap="flat" cmpd="sng" algn="ctr">
           <a:solidFill>
@@ -1083,10 +1083,10 @@
         <a:lstStyle/>
         <a:p>
           <a:r>
-            <a:rPr lang="en-US" dirty="0" smtClean="0"/>
+            <a:rPr lang="en-US" sz="1000" dirty="0" smtClean="0"/>
             <a:t>Data Source</a:t>
           </a:r>
-          <a:endParaRPr lang="en-US" dirty="0"/>
+          <a:endParaRPr lang="en-US" sz="1000" dirty="0"/>
         </a:p>
       </dgm:t>
     </dgm:pt>
@@ -1097,7 +1097,7 @@
         <a:bodyPr/>
         <a:lstStyle/>
         <a:p>
-          <a:endParaRPr lang="en-US"/>
+          <a:endParaRPr lang="en-US" sz="2000"/>
         </a:p>
       </dgm:t>
     </dgm:pt>
@@ -1122,12 +1122,12 @@
         <a:bodyPr/>
         <a:lstStyle/>
         <a:p>
-          <a:endParaRPr lang="en-US"/>
+          <a:endParaRPr lang="en-US" sz="2000"/>
         </a:p>
       </dgm:t>
     </dgm:pt>
     <dgm:pt modelId="{54F76FF2-0BB1-1C46-B95F-60C5A77D58E1}">
-      <dgm:prSet phldrT="[Text]"/>
+      <dgm:prSet phldrT="[Text]" custT="1"/>
       <dgm:spPr>
         <a:ln w="28575" cap="flat" cmpd="sng" algn="ctr">
           <a:solidFill>
@@ -1149,10 +1149,10 @@
         <a:lstStyle/>
         <a:p>
           <a:r>
-            <a:rPr lang="en-US" dirty="0" smtClean="0"/>
+            <a:rPr lang="en-US" sz="1000" dirty="0" smtClean="0"/>
             <a:t>Data Source</a:t>
           </a:r>
-          <a:endParaRPr lang="en-US" dirty="0"/>
+          <a:endParaRPr lang="en-US" sz="1000" dirty="0"/>
         </a:p>
       </dgm:t>
     </dgm:pt>
@@ -1163,7 +1163,7 @@
         <a:bodyPr/>
         <a:lstStyle/>
         <a:p>
-          <a:endParaRPr lang="en-US"/>
+          <a:endParaRPr lang="en-US" sz="2000"/>
         </a:p>
       </dgm:t>
     </dgm:pt>
@@ -1188,7 +1188,7 @@
         <a:bodyPr/>
         <a:lstStyle/>
         <a:p>
-          <a:endParaRPr lang="en-US"/>
+          <a:endParaRPr lang="en-US" sz="2000"/>
         </a:p>
       </dgm:t>
     </dgm:pt>
@@ -1381,8 +1381,8 @@
       </dsp:nvSpPr>
       <dsp:spPr>
         <a:xfrm>
-          <a:off x="683514" y="452"/>
-          <a:ext cx="514473" cy="334407"/>
+          <a:off x="714197" y="304"/>
+          <a:ext cx="578019" cy="375712"/>
         </a:xfrm>
         <a:prstGeom prst="roundRect">
           <a:avLst/>
@@ -1432,12 +1432,12 @@
         </a:fontRef>
       </dsp:style>
       <dsp:txBody>
-        <a:bodyPr spcFirstLastPara="0" vert="horz" wrap="square" lIns="30480" tIns="30480" rIns="30480" bIns="30480" numCol="1" spcCol="1270" anchor="ctr" anchorCtr="0">
+        <a:bodyPr spcFirstLastPara="0" vert="horz" wrap="square" lIns="38100" tIns="38100" rIns="38100" bIns="38100" numCol="1" spcCol="1270" anchor="ctr" anchorCtr="0">
           <a:noAutofit/>
         </a:bodyPr>
         <a:lstStyle/>
         <a:p>
-          <a:pPr lvl="0" algn="ctr" defTabSz="355600">
+          <a:pPr lvl="0" algn="ctr" defTabSz="444500">
             <a:lnSpc>
               <a:spcPct val="90000"/>
             </a:lnSpc>
@@ -1449,15 +1449,15 @@
             </a:spcAft>
           </a:pPr>
           <a:r>
-            <a:rPr lang="en-US" sz="800" kern="1200" dirty="0" smtClean="0"/>
+            <a:rPr lang="en-US" sz="1000" kern="1200" dirty="0" smtClean="0"/>
             <a:t>Data Source</a:t>
           </a:r>
-          <a:endParaRPr lang="en-US" sz="800" kern="1200" dirty="0"/>
+          <a:endParaRPr lang="en-US" sz="1000" kern="1200" dirty="0"/>
         </a:p>
       </dsp:txBody>
       <dsp:txXfrm>
-        <a:off x="683514" y="452"/>
-        <a:ext cx="514473" cy="334407"/>
+        <a:off x="714197" y="304"/>
+        <a:ext cx="578019" cy="375712"/>
       </dsp:txXfrm>
     </dsp:sp>
     <dsp:sp modelId="{EE7380DF-68AD-924B-A456-3ED37DC9E29D}">
@@ -1467,8 +1467,8 @@
       </dsp:nvSpPr>
       <dsp:spPr>
         <a:xfrm>
-          <a:off x="388114" y="167655"/>
-          <a:ext cx="1105273" cy="1105273"/>
+          <a:off x="381565" y="188161"/>
+          <a:ext cx="1243282" cy="1243282"/>
         </a:xfrm>
         <a:custGeom>
           <a:avLst/>
@@ -1479,9 +1479,9 @@
           <a:pathLst>
             <a:path>
               <a:moveTo>
-                <a:pt x="880939" y="108086"/>
+                <a:pt x="990715" y="121419"/>
               </a:moveTo>
-              <a:arcTo wR="552636" hR="552636" stAng="18386768" swAng="1634236"/>
+              <a:arcTo wR="621641" hR="621641" stAng="18385245" swAng="1636423"/>
             </a:path>
           </a:pathLst>
         </a:custGeom>
@@ -1521,8 +1521,8 @@
       </dsp:nvSpPr>
       <dsp:spPr>
         <a:xfrm>
-          <a:off x="1236150" y="553088"/>
-          <a:ext cx="514473" cy="334407"/>
+          <a:off x="1335838" y="621946"/>
+          <a:ext cx="578019" cy="375712"/>
         </a:xfrm>
         <a:prstGeom prst="roundRect">
           <a:avLst/>
@@ -1572,12 +1572,12 @@
         </a:fontRef>
       </dsp:style>
       <dsp:txBody>
-        <a:bodyPr spcFirstLastPara="0" vert="horz" wrap="square" lIns="30480" tIns="30480" rIns="30480" bIns="30480" numCol="1" spcCol="1270" anchor="ctr" anchorCtr="0">
+        <a:bodyPr spcFirstLastPara="0" vert="horz" wrap="square" lIns="38100" tIns="38100" rIns="38100" bIns="38100" numCol="1" spcCol="1270" anchor="ctr" anchorCtr="0">
           <a:noAutofit/>
         </a:bodyPr>
         <a:lstStyle/>
         <a:p>
-          <a:pPr lvl="0" algn="ctr" defTabSz="355600">
+          <a:pPr lvl="0" algn="ctr" defTabSz="444500">
             <a:lnSpc>
               <a:spcPct val="90000"/>
             </a:lnSpc>
@@ -1589,15 +1589,15 @@
             </a:spcAft>
           </a:pPr>
           <a:r>
-            <a:rPr lang="en-US" sz="800" kern="1200" dirty="0" smtClean="0"/>
+            <a:rPr lang="en-US" sz="1000" kern="1200" dirty="0" smtClean="0"/>
             <a:t>Data Source</a:t>
           </a:r>
-          <a:endParaRPr lang="en-US" sz="800" kern="1200" dirty="0"/>
+          <a:endParaRPr lang="en-US" sz="1000" kern="1200" dirty="0"/>
         </a:p>
       </dsp:txBody>
       <dsp:txXfrm>
-        <a:off x="1236150" y="553088"/>
-        <a:ext cx="514473" cy="334407"/>
+        <a:off x="1335838" y="621946"/>
+        <a:ext cx="578019" cy="375712"/>
       </dsp:txXfrm>
     </dsp:sp>
     <dsp:sp modelId="{D85F0B7B-6ABC-AC4B-A798-626AE21931B2}">
@@ -1607,8 +1607,8 @@
       </dsp:nvSpPr>
       <dsp:spPr>
         <a:xfrm>
-          <a:off x="388114" y="167655"/>
-          <a:ext cx="1105273" cy="1105273"/>
+          <a:off x="381565" y="188161"/>
+          <a:ext cx="1243282" cy="1243282"/>
         </a:xfrm>
         <a:custGeom>
           <a:avLst/>
@@ -1619,9 +1619,9 @@
           <a:pathLst>
             <a:path>
               <a:moveTo>
-                <a:pt x="1047996" y="797637"/>
+                <a:pt x="1178907" y="897126"/>
               </a:moveTo>
-              <a:arcTo wR="552636" hR="552636" stAng="1578996" swAng="1634236"/>
+              <a:arcTo wR="621641" hR="621641" stAng="1578332" swAng="1636423"/>
             </a:path>
           </a:pathLst>
         </a:custGeom>
@@ -1661,8 +1661,8 @@
       </dsp:nvSpPr>
       <dsp:spPr>
         <a:xfrm>
-          <a:off x="683514" y="1105725"/>
-          <a:ext cx="514473" cy="334407"/>
+          <a:off x="714197" y="1243587"/>
+          <a:ext cx="578019" cy="375712"/>
         </a:xfrm>
         <a:prstGeom prst="roundRect">
           <a:avLst/>
@@ -1712,12 +1712,12 @@
         </a:fontRef>
       </dsp:style>
       <dsp:txBody>
-        <a:bodyPr spcFirstLastPara="0" vert="horz" wrap="square" lIns="30480" tIns="30480" rIns="30480" bIns="30480" numCol="1" spcCol="1270" anchor="ctr" anchorCtr="0">
+        <a:bodyPr spcFirstLastPara="0" vert="horz" wrap="square" lIns="38100" tIns="38100" rIns="38100" bIns="38100" numCol="1" spcCol="1270" anchor="ctr" anchorCtr="0">
           <a:noAutofit/>
         </a:bodyPr>
         <a:lstStyle/>
         <a:p>
-          <a:pPr lvl="0" algn="ctr" defTabSz="355600">
+          <a:pPr lvl="0" algn="ctr" defTabSz="444500">
             <a:lnSpc>
               <a:spcPct val="90000"/>
             </a:lnSpc>
@@ -1729,15 +1729,15 @@
             </a:spcAft>
           </a:pPr>
           <a:r>
-            <a:rPr lang="en-US" sz="800" kern="1200" dirty="0" smtClean="0"/>
+            <a:rPr lang="en-US" sz="1000" kern="1200" dirty="0" smtClean="0"/>
             <a:t>Data Source</a:t>
           </a:r>
-          <a:endParaRPr lang="en-US" sz="800" kern="1200" dirty="0"/>
+          <a:endParaRPr lang="en-US" sz="1000" kern="1200" dirty="0"/>
         </a:p>
       </dsp:txBody>
       <dsp:txXfrm>
-        <a:off x="683514" y="1105725"/>
-        <a:ext cx="514473" cy="334407"/>
+        <a:off x="714197" y="1243587"/>
+        <a:ext cx="578019" cy="375712"/>
       </dsp:txXfrm>
     </dsp:sp>
     <dsp:sp modelId="{410836D3-0383-804A-9785-53DDA4B90AAE}">
@@ -1747,8 +1747,8 @@
       </dsp:nvSpPr>
       <dsp:spPr>
         <a:xfrm>
-          <a:off x="388114" y="167655"/>
-          <a:ext cx="1105273" cy="1105273"/>
+          <a:off x="381565" y="188161"/>
+          <a:ext cx="1243282" cy="1243282"/>
         </a:xfrm>
         <a:custGeom>
           <a:avLst/>
@@ -1759,9 +1759,9 @@
           <a:pathLst>
             <a:path>
               <a:moveTo>
-                <a:pt x="224333" y="997186"/>
+                <a:pt x="252566" y="1121862"/>
               </a:moveTo>
-              <a:arcTo wR="552636" hR="552636" stAng="7586768" swAng="1634236"/>
+              <a:arcTo wR="621641" hR="621641" stAng="7585245" swAng="1636423"/>
             </a:path>
           </a:pathLst>
         </a:custGeom>
@@ -1801,8 +1801,8 @@
       </dsp:nvSpPr>
       <dsp:spPr>
         <a:xfrm>
-          <a:off x="130877" y="553088"/>
-          <a:ext cx="514473" cy="334407"/>
+          <a:off x="92556" y="621946"/>
+          <a:ext cx="578019" cy="375712"/>
         </a:xfrm>
         <a:prstGeom prst="roundRect">
           <a:avLst/>
@@ -1852,12 +1852,12 @@
         </a:fontRef>
       </dsp:style>
       <dsp:txBody>
-        <a:bodyPr spcFirstLastPara="0" vert="horz" wrap="square" lIns="30480" tIns="30480" rIns="30480" bIns="30480" numCol="1" spcCol="1270" anchor="ctr" anchorCtr="0">
+        <a:bodyPr spcFirstLastPara="0" vert="horz" wrap="square" lIns="38100" tIns="38100" rIns="38100" bIns="38100" numCol="1" spcCol="1270" anchor="ctr" anchorCtr="0">
           <a:noAutofit/>
         </a:bodyPr>
         <a:lstStyle/>
         <a:p>
-          <a:pPr lvl="0" algn="ctr" defTabSz="355600">
+          <a:pPr lvl="0" algn="ctr" defTabSz="444500">
             <a:lnSpc>
               <a:spcPct val="90000"/>
             </a:lnSpc>
@@ -1869,15 +1869,15 @@
             </a:spcAft>
           </a:pPr>
           <a:r>
-            <a:rPr lang="en-US" sz="800" kern="1200" dirty="0" smtClean="0"/>
+            <a:rPr lang="en-US" sz="1000" kern="1200" dirty="0" smtClean="0"/>
             <a:t>Data Source</a:t>
           </a:r>
-          <a:endParaRPr lang="en-US" sz="800" kern="1200" dirty="0"/>
+          <a:endParaRPr lang="en-US" sz="1000" kern="1200" dirty="0"/>
         </a:p>
       </dsp:txBody>
       <dsp:txXfrm>
-        <a:off x="130877" y="553088"/>
-        <a:ext cx="514473" cy="334407"/>
+        <a:off x="92556" y="621946"/>
+        <a:ext cx="578019" cy="375712"/>
       </dsp:txXfrm>
     </dsp:sp>
     <dsp:sp modelId="{2789C9A7-195A-4946-A2A2-E11184182862}">
@@ -1887,8 +1887,8 @@
       </dsp:nvSpPr>
       <dsp:spPr>
         <a:xfrm>
-          <a:off x="388114" y="167655"/>
-          <a:ext cx="1105273" cy="1105273"/>
+          <a:off x="381565" y="188161"/>
+          <a:ext cx="1243282" cy="1243282"/>
         </a:xfrm>
         <a:custGeom>
           <a:avLst/>
@@ -1899,9 +1899,9 @@
           <a:pathLst>
             <a:path>
               <a:moveTo>
-                <a:pt x="57276" y="307635"/>
+                <a:pt x="64374" y="346156"/>
               </a:moveTo>
-              <a:arcTo wR="552636" hR="552636" stAng="12378996" swAng="1634236"/>
+              <a:arcTo wR="621641" hR="621641" stAng="12378332" swAng="1636423"/>
             </a:path>
           </a:pathLst>
         </a:custGeom>
@@ -6335,7 +6335,11 @@
             <a:p>
               <a:r>
                 <a:rPr lang="en-US" dirty="0" smtClean="0"/>
-                <a:t>Bluetooth stack</a:t>
+                <a:t>Bluetooth</a:t>
+              </a:r>
+              <a:r>
+                <a:rPr lang="en-US" dirty="0" smtClean="0"/>
+                <a:t> Stack</a:t>
               </a:r>
               <a:endParaRPr lang="en-US" dirty="0"/>
             </a:p>
@@ -6805,8 +6809,8 @@
             <p:nvPr/>
           </p:nvGraphicFramePr>
           <p:xfrm>
-            <a:off x="1890281" y="1228684"/>
-            <a:ext cx="1708720" cy="1523987"/>
+            <a:off x="1818779" y="1228684"/>
+            <a:ext cx="1822161" cy="1713371"/>
           </p:xfrm>
           <a:graphic>
             <a:graphicData uri="http://schemas.openxmlformats.org/drawingml/2006/diagram">
@@ -7386,8 +7390,8 @@
         </p:nvSpPr>
         <p:spPr>
           <a:xfrm>
-            <a:off x="496440" y="4022448"/>
-            <a:ext cx="1089907" cy="473363"/>
+            <a:off x="438718" y="4022448"/>
+            <a:ext cx="1147629" cy="473363"/>
           </a:xfrm>
           <a:prstGeom prst="rect">
             <a:avLst/>
@@ -7426,12 +7430,25 @@
               <a:rPr lang="en-US" sz="1400" dirty="0" smtClean="0"/>
               <a:t> </a:t>
             </a:r>
+            <a:endParaRPr lang="en-US" sz="1400" dirty="0" smtClean="0"/>
           </a:p>
           <a:p>
             <a:pPr algn="r"/>
             <a:r>
               <a:rPr lang="en-US" sz="1400" dirty="0" smtClean="0"/>
-              <a:t>client library</a:t>
+              <a:t>C</a:t>
+            </a:r>
+            <a:r>
+              <a:rPr lang="en-US" sz="1400" dirty="0" smtClean="0"/>
+              <a:t>lient </a:t>
+            </a:r>
+            <a:r>
+              <a:rPr lang="en-US" sz="1400" dirty="0" smtClean="0"/>
+              <a:t>L</a:t>
+            </a:r>
+            <a:r>
+              <a:rPr lang="en-US" sz="1400" dirty="0" smtClean="0"/>
+              <a:t>ibrary</a:t>
             </a:r>
             <a:endParaRPr lang="en-US" sz="1400" dirty="0"/>
           </a:p>

</xml_diff>

<commit_message>
added timeouts and title to architecture.png
</commit_message>
<xml_diff>
--- a/files/BTstack_diagrams.pptx
+++ b/files/BTstack_diagrams.pptx
@@ -1082,10 +1082,6 @@
         <a:bodyPr/>
         <a:lstStyle/>
         <a:p>
-          <a:r>
-            <a:rPr lang="en-US" sz="1000" dirty="0" smtClean="0"/>
-            <a:t>Data Source</a:t>
-          </a:r>
           <a:endParaRPr lang="en-US" sz="1000" dirty="0"/>
         </a:p>
       </dgm:t>
@@ -1269,7 +1265,7 @@
       </dgm:t>
     </dgm:pt>
     <dgm:pt modelId="{2B315FF2-E9DF-5245-9F13-FE8CC0E5EB75}" type="pres">
-      <dgm:prSet presAssocID="{6C85830B-5DCD-5E4E-97A4-C644D9793A17}" presName="node" presStyleLbl="node1" presStyleIdx="2" presStyleCnt="4">
+      <dgm:prSet presAssocID="{6C85830B-5DCD-5E4E-97A4-C644D9793A17}" presName="node" presStyleLbl="node1" presStyleIdx="2" presStyleCnt="4" custScaleX="128138">
         <dgm:presLayoutVars>
           <dgm:bulletEnabled val="1"/>
         </dgm:presLayoutVars>
@@ -1333,8 +1329,8 @@
     <dgm:cxn modelId="{E30A4D83-D538-4745-A690-C59CE9019CA5}" type="presOf" srcId="{22363D14-147D-B64D-8005-99D54197B02C}" destId="{EE7380DF-68AD-924B-A456-3ED37DC9E29D}" srcOrd="0" destOrd="0" presId="urn:microsoft.com/office/officeart/2005/8/layout/cycle5"/>
     <dgm:cxn modelId="{2345D506-8B33-1849-A305-8AE9C5E46242}" type="presOf" srcId="{B119A6BE-4C69-C64A-9760-20D7BEA835F3}" destId="{E09AF273-F887-4A4E-BB1A-63355DC4B692}" srcOrd="0" destOrd="0" presId="urn:microsoft.com/office/officeart/2005/8/layout/cycle5"/>
     <dgm:cxn modelId="{D0213F14-02AF-044F-AB05-E00EFD8A9AB7}" srcId="{9B78ECA7-0B64-D04E-831C-723D6F868605}" destId="{54F76FF2-0BB1-1C46-B95F-60C5A77D58E1}" srcOrd="3" destOrd="0" parTransId="{C5BB0B68-42FE-8A48-B24E-505F9EE267A7}" sibTransId="{91E76C52-8B95-CA4E-9FC5-AC99FA090AAD}"/>
+    <dgm:cxn modelId="{EE77C417-DD0C-6245-B2C9-1987E4BE7B5F}" srcId="{9B78ECA7-0B64-D04E-831C-723D6F868605}" destId="{B119A6BE-4C69-C64A-9760-20D7BEA835F3}" srcOrd="1" destOrd="0" parTransId="{CE851766-E441-AC47-93B3-8723BB0078AA}" sibTransId="{1349B9CE-3161-9A42-BA65-4CB34DD6C9E8}"/>
     <dgm:cxn modelId="{4C840A7B-64E7-AB49-86C1-7E07AAD52866}" type="presOf" srcId="{A5C862F1-617D-F04C-A0E0-577A46468776}" destId="{F1C32FC9-C546-9F40-95DC-BA276F331782}" srcOrd="0" destOrd="0" presId="urn:microsoft.com/office/officeart/2005/8/layout/cycle5"/>
-    <dgm:cxn modelId="{EE77C417-DD0C-6245-B2C9-1987E4BE7B5F}" srcId="{9B78ECA7-0B64-D04E-831C-723D6F868605}" destId="{B119A6BE-4C69-C64A-9760-20D7BEA835F3}" srcOrd="1" destOrd="0" parTransId="{CE851766-E441-AC47-93B3-8723BB0078AA}" sibTransId="{1349B9CE-3161-9A42-BA65-4CB34DD6C9E8}"/>
     <dgm:cxn modelId="{0FFE7FA1-025B-CF46-80B6-17563144DAD8}" type="presOf" srcId="{9B78ECA7-0B64-D04E-831C-723D6F868605}" destId="{9A6545F5-DD56-D24E-BD5C-EB199E39B87F}" srcOrd="0" destOrd="0" presId="urn:microsoft.com/office/officeart/2005/8/layout/cycle5"/>
     <dgm:cxn modelId="{B276B920-901E-5D40-AB84-B322818C92C2}" type="presOf" srcId="{1349B9CE-3161-9A42-BA65-4CB34DD6C9E8}" destId="{D85F0B7B-6ABC-AC4B-A798-626AE21931B2}" srcOrd="0" destOrd="0" presId="urn:microsoft.com/office/officeart/2005/8/layout/cycle5"/>
     <dgm:cxn modelId="{9EBE1252-2776-8247-8F28-733AE492CFB0}" type="presOf" srcId="{54F76FF2-0BB1-1C46-B95F-60C5A77D58E1}" destId="{95D1D6F1-C08E-A741-B677-328DAC42AE95}" srcOrd="0" destOrd="0" presId="urn:microsoft.com/office/officeart/2005/8/layout/cycle5"/>
@@ -1619,9 +1615,9 @@
           <a:pathLst>
             <a:path>
               <a:moveTo>
-                <a:pt x="1178907" y="897126"/>
+                <a:pt x="1186668" y="880835"/>
               </a:moveTo>
-              <a:arcTo wR="621641" hR="621641" stAng="1578332" swAng="1636423"/>
+              <a:arcTo wR="621641" hR="621641" stAng="1478535" swAng="1304408"/>
             </a:path>
           </a:pathLst>
         </a:custGeom>
@@ -1661,8 +1657,8 @@
       </dsp:nvSpPr>
       <dsp:spPr>
         <a:xfrm>
-          <a:off x="714197" y="1243587"/>
-          <a:ext cx="578019" cy="375712"/>
+          <a:off x="632875" y="1243587"/>
+          <a:ext cx="740662" cy="375712"/>
         </a:xfrm>
         <a:prstGeom prst="roundRect">
           <a:avLst/>
@@ -1728,16 +1724,12 @@
               <a:spcPct val="35000"/>
             </a:spcAft>
           </a:pPr>
-          <a:r>
-            <a:rPr lang="en-US" sz="1000" kern="1200" dirty="0" smtClean="0"/>
-            <a:t>Data Source</a:t>
-          </a:r>
           <a:endParaRPr lang="en-US" sz="1000" kern="1200" dirty="0"/>
         </a:p>
       </dsp:txBody>
       <dsp:txXfrm>
-        <a:off x="714197" y="1243587"/>
-        <a:ext cx="578019" cy="375712"/>
+        <a:off x="632875" y="1243587"/>
+        <a:ext cx="740662" cy="375712"/>
       </dsp:txXfrm>
     </dsp:sp>
     <dsp:sp modelId="{410836D3-0383-804A-9785-53DDA4B90AAE}">
@@ -1759,9 +1751,9 @@
           <a:pathLst>
             <a:path>
               <a:moveTo>
-                <a:pt x="252566" y="1121862"/>
+                <a:pt x="192806" y="1071684"/>
               </a:moveTo>
-              <a:arcTo wR="621641" hR="621641" stAng="7585245" swAng="1636423"/>
+              <a:arcTo wR="621641" hR="621641" stAng="8017057" swAng="1304408"/>
             </a:path>
           </a:pathLst>
         </a:custGeom>
@@ -6335,11 +6327,7 @@
             <a:p>
               <a:r>
                 <a:rPr lang="en-US" dirty="0" smtClean="0"/>
-                <a:t>Bluetooth</a:t>
-              </a:r>
-              <a:r>
-                <a:rPr lang="en-US" dirty="0" smtClean="0"/>
-                <a:t> Stack</a:t>
+                <a:t>Bluetooth Stack</a:t>
               </a:r>
               <a:endParaRPr lang="en-US" dirty="0"/>
             </a:p>
@@ -7430,27 +7418,282 @@
               <a:rPr lang="en-US" sz="1400" dirty="0" smtClean="0"/>
               <a:t> </a:t>
             </a:r>
-            <a:endParaRPr lang="en-US" sz="1400" dirty="0" smtClean="0"/>
           </a:p>
           <a:p>
             <a:pPr algn="r"/>
             <a:r>
               <a:rPr lang="en-US" sz="1400" dirty="0" smtClean="0"/>
-              <a:t>C</a:t>
+              <a:t>Client Library</a:t>
+            </a:r>
+            <a:endParaRPr lang="en-US" sz="1400" dirty="0"/>
+          </a:p>
+        </p:txBody>
+      </p:sp>
+      <p:cxnSp>
+        <p:nvCxnSpPr>
+          <p:cNvPr id="46" name="Straight Connector 45"/>
+          <p:cNvCxnSpPr/>
+          <p:nvPr/>
+        </p:nvCxnSpPr>
+        <p:spPr>
+          <a:xfrm rot="5400000">
+            <a:off x="3859671" y="2943803"/>
+            <a:ext cx="360000" cy="0"/>
+          </a:xfrm>
+          <a:prstGeom prst="line">
+            <a:avLst/>
+          </a:prstGeom>
+          <a:ln w="12700" cap="flat" cmpd="sng" algn="ctr">
+            <a:solidFill>
+              <a:schemeClr val="bg1">
+                <a:lumMod val="50000"/>
+              </a:schemeClr>
+            </a:solidFill>
+            <a:prstDash val="solid"/>
+            <a:round/>
+            <a:headEnd type="none" w="med" len="med"/>
+            <a:tailEnd type="none" w="med" len="med"/>
+          </a:ln>
+        </p:spPr>
+        <p:style>
+          <a:lnRef idx="2">
+            <a:schemeClr val="accent1"/>
+          </a:lnRef>
+          <a:fillRef idx="0">
+            <a:schemeClr val="accent1"/>
+          </a:fillRef>
+          <a:effectRef idx="1">
+            <a:schemeClr val="accent1"/>
+          </a:effectRef>
+          <a:fontRef idx="minor">
+            <a:schemeClr val="tx1"/>
+          </a:fontRef>
+        </p:style>
+      </p:cxnSp>
+      <p:cxnSp>
+        <p:nvCxnSpPr>
+          <p:cNvPr id="49" name="Straight Connector 48"/>
+          <p:cNvCxnSpPr/>
+          <p:nvPr/>
+        </p:nvCxnSpPr>
+        <p:spPr>
+          <a:xfrm rot="5400000">
+            <a:off x="4110204" y="2932258"/>
+            <a:ext cx="360000" cy="0"/>
+          </a:xfrm>
+          <a:prstGeom prst="line">
+            <a:avLst/>
+          </a:prstGeom>
+          <a:ln w="12700" cap="flat" cmpd="sng" algn="ctr">
+            <a:solidFill>
+              <a:schemeClr val="bg1">
+                <a:lumMod val="50000"/>
+              </a:schemeClr>
+            </a:solidFill>
+            <a:prstDash val="solid"/>
+            <a:round/>
+            <a:headEnd type="none" w="med" len="med"/>
+            <a:tailEnd type="none" w="med" len="med"/>
+          </a:ln>
+        </p:spPr>
+        <p:style>
+          <a:lnRef idx="2">
+            <a:schemeClr val="accent1"/>
+          </a:lnRef>
+          <a:fillRef idx="0">
+            <a:schemeClr val="accent1"/>
+          </a:fillRef>
+          <a:effectRef idx="1">
+            <a:schemeClr val="accent1"/>
+          </a:effectRef>
+          <a:fontRef idx="minor">
+            <a:schemeClr val="tx1"/>
+          </a:fontRef>
+        </p:style>
+      </p:cxnSp>
+      <p:cxnSp>
+        <p:nvCxnSpPr>
+          <p:cNvPr id="56" name="Straight Connector 55"/>
+          <p:cNvCxnSpPr/>
+          <p:nvPr/>
+        </p:nvCxnSpPr>
+        <p:spPr>
+          <a:xfrm rot="5400000">
+            <a:off x="3988981" y="2934573"/>
+            <a:ext cx="360000" cy="0"/>
+          </a:xfrm>
+          <a:prstGeom prst="line">
+            <a:avLst/>
+          </a:prstGeom>
+          <a:ln w="12700" cap="flat" cmpd="sng" algn="ctr">
+            <a:solidFill>
+              <a:schemeClr val="bg1">
+                <a:lumMod val="50000"/>
+              </a:schemeClr>
+            </a:solidFill>
+            <a:prstDash val="solid"/>
+            <a:round/>
+            <a:headEnd type="none" w="med" len="med"/>
+            <a:tailEnd type="none" w="med" len="med"/>
+          </a:ln>
+        </p:spPr>
+        <p:style>
+          <a:lnRef idx="2">
+            <a:schemeClr val="accent1"/>
+          </a:lnRef>
+          <a:fillRef idx="0">
+            <a:schemeClr val="accent1"/>
+          </a:fillRef>
+          <a:effectRef idx="1">
+            <a:schemeClr val="accent1"/>
+          </a:effectRef>
+          <a:fontRef idx="minor">
+            <a:schemeClr val="tx1"/>
+          </a:fontRef>
+        </p:style>
+      </p:cxnSp>
+      <p:cxnSp>
+        <p:nvCxnSpPr>
+          <p:cNvPr id="57" name="Straight Connector 56"/>
+          <p:cNvCxnSpPr/>
+          <p:nvPr/>
+        </p:nvCxnSpPr>
+        <p:spPr>
+          <a:xfrm rot="5400000">
+            <a:off x="4239514" y="2934573"/>
+            <a:ext cx="360000" cy="0"/>
+          </a:xfrm>
+          <a:prstGeom prst="line">
+            <a:avLst/>
+          </a:prstGeom>
+          <a:ln w="12700" cap="flat" cmpd="sng" algn="ctr">
+            <a:solidFill>
+              <a:schemeClr val="bg1">
+                <a:lumMod val="50000"/>
+              </a:schemeClr>
+            </a:solidFill>
+            <a:prstDash val="solid"/>
+            <a:round/>
+            <a:headEnd type="none" w="med" len="med"/>
+            <a:tailEnd type="none" w="med" len="med"/>
+          </a:ln>
+        </p:spPr>
+        <p:style>
+          <a:lnRef idx="2">
+            <a:schemeClr val="accent1"/>
+          </a:lnRef>
+          <a:fillRef idx="0">
+            <a:schemeClr val="accent1"/>
+          </a:fillRef>
+          <a:effectRef idx="1">
+            <a:schemeClr val="accent1"/>
+          </a:effectRef>
+          <a:fontRef idx="minor">
+            <a:schemeClr val="tx1"/>
+          </a:fontRef>
+        </p:style>
+      </p:cxnSp>
+      <p:cxnSp>
+        <p:nvCxnSpPr>
+          <p:cNvPr id="59" name="Straight Connector 58"/>
+          <p:cNvCxnSpPr/>
+          <p:nvPr/>
+        </p:nvCxnSpPr>
+        <p:spPr>
+          <a:xfrm rot="5400000">
+            <a:off x="3746536" y="2934573"/>
+            <a:ext cx="360000" cy="0"/>
+          </a:xfrm>
+          <a:prstGeom prst="line">
+            <a:avLst/>
+          </a:prstGeom>
+          <a:ln w="12700" cap="flat" cmpd="sng" algn="ctr">
+            <a:solidFill>
+              <a:schemeClr val="bg1">
+                <a:lumMod val="50000"/>
+              </a:schemeClr>
+            </a:solidFill>
+            <a:prstDash val="solid"/>
+            <a:round/>
+            <a:headEnd type="none" w="med" len="med"/>
+            <a:tailEnd type="none" w="med" len="med"/>
+          </a:ln>
+        </p:spPr>
+        <p:style>
+          <a:lnRef idx="2">
+            <a:schemeClr val="accent1"/>
+          </a:lnRef>
+          <a:fillRef idx="0">
+            <a:schemeClr val="accent1"/>
+          </a:fillRef>
+          <a:effectRef idx="1">
+            <a:schemeClr val="accent1"/>
+          </a:effectRef>
+          <a:fontRef idx="minor">
+            <a:schemeClr val="tx1"/>
+          </a:fontRef>
+        </p:style>
+      </p:cxnSp>
+      <p:sp>
+        <p:nvSpPr>
+          <p:cNvPr id="62" name="Rectangle 61"/>
+          <p:cNvSpPr/>
+          <p:nvPr/>
+        </p:nvSpPr>
+        <p:spPr>
+          <a:xfrm>
+            <a:off x="1674090" y="5314961"/>
+            <a:ext cx="3145788" cy="523220"/>
+          </a:xfrm>
+          <a:prstGeom prst="rect">
+            <a:avLst/>
+          </a:prstGeom>
+        </p:spPr>
+        <p:txBody>
+          <a:bodyPr wrap="none">
+            <a:spAutoFit/>
+          </a:bodyPr>
+          <a:lstStyle/>
+          <a:p>
+            <a:r>
+              <a:rPr lang="en-US" sz="2800" dirty="0" err="1" smtClean="0"/>
+              <a:t>BTstack</a:t>
             </a:r>
             <a:r>
-              <a:rPr lang="en-US" sz="1400" dirty="0" smtClean="0"/>
-              <a:t>lient </a:t>
+              <a:rPr lang="en-US" sz="2800" dirty="0" smtClean="0"/>
+              <a:t> Architecture</a:t>
             </a:r>
+            <a:endParaRPr lang="en-US" sz="2800" dirty="0"/>
+          </a:p>
+        </p:txBody>
+      </p:sp>
+      <p:sp>
+        <p:nvSpPr>
+          <p:cNvPr id="53" name="Rectangle 52"/>
+          <p:cNvSpPr/>
+          <p:nvPr/>
+        </p:nvSpPr>
+        <p:spPr>
+          <a:xfrm>
+            <a:off x="3831865" y="2794612"/>
+            <a:ext cx="731634" cy="261610"/>
+          </a:xfrm>
+          <a:prstGeom prst="rect">
+            <a:avLst/>
+          </a:prstGeom>
+        </p:spPr>
+        <p:txBody>
+          <a:bodyPr wrap="none" anchor="ctr">
+            <a:spAutoFit/>
+          </a:bodyPr>
+          <a:lstStyle/>
+          <a:p>
+            <a:pPr lvl="0" algn="ctr"/>
             <a:r>
-              <a:rPr lang="en-US" sz="1400" dirty="0" smtClean="0"/>
-              <a:t>L</a:t>
+              <a:rPr lang="en-US" sz="1100" dirty="0" smtClean="0"/>
+              <a:t>Timeouts </a:t>
             </a:r>
-            <a:r>
-              <a:rPr lang="en-US" sz="1400" dirty="0" smtClean="0"/>
-              <a:t>ibrary</a:t>
-            </a:r>
-            <a:endParaRPr lang="en-US" sz="1400" dirty="0"/>
+            <a:endParaRPr lang="en-US" sz="1100" dirty="0"/>
           </a:p>
         </p:txBody>
       </p:sp>
@@ -7459,6 +7702,14 @@
   <p:clrMapOvr>
     <a:masterClrMapping/>
   </p:clrMapOvr>
+  <p:transition/>
+  <p:timing>
+    <p:tnLst>
+      <p:par>
+        <p:cTn id="1" dur="indefinite" restart="never" nodeType="tmRoot"/>
+      </p:par>
+    </p:tnLst>
+  </p:timing>
 </p:sld>
 </file>
 

</xml_diff>